<commit_message>
Update FINAL PROJECT - DATA SCIENCE.pptx
</commit_message>
<xml_diff>
--- a/Media Files/FINAL PROJECT - DATA SCIENCE.pptx
+++ b/Media Files/FINAL PROJECT - DATA SCIENCE.pptx
@@ -8186,7 +8186,7 @@
         <p:spPr>
           <a:xfrm>
             <a:off x="3249400" y="771150"/>
-            <a:ext cx="5749800" cy="3648000"/>
+            <a:ext cx="5749800" cy="3879000"/>
           </a:xfrm>
           <a:prstGeom prst="rect">
             <a:avLst/>
@@ -8226,33 +8226,8 @@
                 <a:cs typeface="Source Sans Pro"/>
                 <a:sym typeface="Source Sans Pro"/>
               </a:rPr>
-              <a:t>How does demographic makeup of a state affect the # of Hate Crimes committed?</a:t>
-            </a:r>
-            <a:endParaRPr sz="1500">
-              <a:solidFill>
-                <a:schemeClr val="dk1"/>
-              </a:solidFill>
-              <a:latin typeface="Source Sans Pro"/>
-              <a:ea typeface="Source Sans Pro"/>
-              <a:cs typeface="Source Sans Pro"/>
-              <a:sym typeface="Source Sans Pro"/>
-            </a:endParaRPr>
-          </a:p>
-          <a:p>
-            <a:pPr indent="-323850" lvl="0" marL="457200" rtl="0" algn="l">
-              <a:spcBef>
-                <a:spcPts val="0"/>
-              </a:spcBef>
-              <a:spcAft>
-                <a:spcPts val="0"/>
-              </a:spcAft>
-              <a:buClr>
-                <a:schemeClr val="dk1"/>
-              </a:buClr>
-              <a:buSzPts val="1500"/>
-              <a:buFont typeface="Source Sans Pro"/>
-              <a:buChar char="-"/>
-            </a:pPr>
+              <a:t>How does demographic makeup of a state affect the # of Hate Crimes committed? the </a:t>
+            </a:r>
             <a:r>
               <a:rPr lang="en" sz="1500">
                 <a:solidFill>
@@ -8263,7 +8238,30 @@
                 <a:cs typeface="Source Sans Pro"/>
                 <a:sym typeface="Source Sans Pro"/>
               </a:rPr>
-              <a:t>How does demographic makeup of a state affect types of Hate Crimes committed?</a:t>
+              <a:t>types of Hate Crimes committed?</a:t>
+            </a:r>
+            <a:endParaRPr sz="1500">
+              <a:solidFill>
+                <a:schemeClr val="dk1"/>
+              </a:solidFill>
+              <a:latin typeface="Source Sans Pro"/>
+              <a:ea typeface="Source Sans Pro"/>
+              <a:cs typeface="Source Sans Pro"/>
+              <a:sym typeface="Source Sans Pro"/>
+            </a:endParaRPr>
+          </a:p>
+          <a:p>
+            <a:pPr indent="0" lvl="0" marL="914400" rtl="0" algn="l">
+              <a:spcBef>
+                <a:spcPts val="0"/>
+              </a:spcBef>
+              <a:spcAft>
+                <a:spcPts val="0"/>
+              </a:spcAft>
+              <a:buNone/>
+            </a:pPr>
+            <a:r>
+              <a:t/>
             </a:r>
             <a:endParaRPr sz="1500">
               <a:solidFill>
@@ -8300,7 +8298,30 @@
                 <a:cs typeface="Source Sans Pro"/>
                 <a:sym typeface="Source Sans Pro"/>
               </a:rPr>
-              <a:t>Realized this question format does not clarify how demographic makeup is being measured using the 8 categories of Race Population</a:t>
+              <a:t>Question format does not clarify how “demographic makeup” is being measured using the 8 categories of Race Population. How is data being combined to present per state within the analysis?</a:t>
+            </a:r>
+            <a:endParaRPr sz="1500">
+              <a:solidFill>
+                <a:schemeClr val="dk1"/>
+              </a:solidFill>
+              <a:latin typeface="Source Sans Pro"/>
+              <a:ea typeface="Source Sans Pro"/>
+              <a:cs typeface="Source Sans Pro"/>
+              <a:sym typeface="Source Sans Pro"/>
+            </a:endParaRPr>
+          </a:p>
+          <a:p>
+            <a:pPr indent="0" lvl="0" marL="457200" rtl="0" algn="l">
+              <a:spcBef>
+                <a:spcPts val="0"/>
+              </a:spcBef>
+              <a:spcAft>
+                <a:spcPts val="0"/>
+              </a:spcAft>
+              <a:buNone/>
+            </a:pPr>
+            <a:r>
+              <a:t/>
             </a:r>
             <a:endParaRPr sz="1500">
               <a:solidFill>
@@ -8773,7 +8794,7 @@
         </p:nvSpPr>
         <p:spPr>
           <a:xfrm>
-            <a:off x="3249325" y="950825"/>
+            <a:off x="3249325" y="1099400"/>
             <a:ext cx="5749800" cy="2493600"/>
           </a:xfrm>
           <a:prstGeom prst="rect">
@@ -8875,7 +8896,7 @@
                 <a:cs typeface="Source Sans Pro"/>
                 <a:sym typeface="Source Sans Pro"/>
               </a:rPr>
-              <a:t> in # of hate crimes among states with different Diversity Indices?</a:t>
+              <a:t> in # of hate crimes among states with different Diversity Indices (DI)?</a:t>
             </a:r>
             <a:endParaRPr sz="1500">
               <a:solidFill>
@@ -8912,7 +8933,7 @@
                 <a:cs typeface="Source Sans Pro"/>
                 <a:sym typeface="Source Sans Pro"/>
               </a:rPr>
-              <a:t>IV is DI </a:t>
+              <a:t>IV = DI </a:t>
             </a:r>
             <a:endParaRPr sz="1500">
               <a:solidFill>
@@ -8986,7 +9007,7 @@
                 <a:cs typeface="Source Sans Pro"/>
                 <a:sym typeface="Source Sans Pro"/>
               </a:rPr>
-              <a:t>DV is Total # of Crimes (controlling for population)</a:t>
+              <a:t>DV = Total # of Crimes (controlling for population)</a:t>
             </a:r>
             <a:endParaRPr sz="1500">
               <a:solidFill>
@@ -9215,7 +9236,7 @@
         <p:spPr>
           <a:xfrm>
             <a:off x="134775" y="127275"/>
-            <a:ext cx="1459800" cy="3879000"/>
+            <a:ext cx="1459800" cy="4340700"/>
           </a:xfrm>
           <a:prstGeom prst="rect">
             <a:avLst/>
@@ -9282,7 +9303,7 @@
                 <a:cs typeface="Source Sans Pro"/>
                 <a:sym typeface="Source Sans Pro"/>
               </a:rPr>
-              <a:t>There is statistically significant association between DI and Total Crime.</a:t>
+              <a:t>There is statistically significant association between DI and Total Hate Crimes.</a:t>
             </a:r>
             <a:endParaRPr sz="1500">
               <a:solidFill>
@@ -9360,7 +9381,7 @@
                 <a:cs typeface="Source Sans Pro"/>
                 <a:sym typeface="Source Sans Pro"/>
               </a:rPr>
-              <a:t>R-squared is 0.287. Only 28% of variation in Total Crime can be explained </a:t>
+              <a:t>R-squared is 0.287. Only 28% of variation in Total Hate Crimes can be explained </a:t>
             </a:r>
             <a:endParaRPr sz="1500">
               <a:solidFill>
@@ -10505,7 +10526,7 @@
         <p:spPr>
           <a:xfrm>
             <a:off x="3249425" y="1144725"/>
-            <a:ext cx="5749800" cy="4109700"/>
+            <a:ext cx="5749800" cy="3879000"/>
           </a:xfrm>
           <a:prstGeom prst="rect">
             <a:avLst/>
@@ -10540,7 +10561,39 @@
                 <a:cs typeface="Source Sans Pro"/>
                 <a:sym typeface="Source Sans Pro"/>
               </a:rPr>
-              <a:t>Original topics were disparate </a:t>
+              <a:t>Initial Dataset team agreed upon for this project:</a:t>
+            </a:r>
+            <a:endParaRPr sz="1500">
+              <a:solidFill>
+                <a:schemeClr val="dk1"/>
+              </a:solidFill>
+              <a:latin typeface="Source Sans Pro"/>
+              <a:ea typeface="Source Sans Pro"/>
+              <a:cs typeface="Source Sans Pro"/>
+              <a:sym typeface="Source Sans Pro"/>
+            </a:endParaRPr>
+          </a:p>
+          <a:p>
+            <a:pPr indent="0" lvl="0" marL="0" rtl="0" algn="ctr">
+              <a:spcBef>
+                <a:spcPts val="0"/>
+              </a:spcBef>
+              <a:spcAft>
+                <a:spcPts val="0"/>
+              </a:spcAft>
+              <a:buNone/>
+            </a:pPr>
+            <a:r>
+              <a:rPr lang="en" sz="1500">
+                <a:solidFill>
+                  <a:schemeClr val="dk1"/>
+                </a:solidFill>
+                <a:latin typeface="Source Sans Pro"/>
+                <a:ea typeface="Source Sans Pro"/>
+                <a:cs typeface="Source Sans Pro"/>
+                <a:sym typeface="Source Sans Pro"/>
+              </a:rPr>
+              <a:t>Hate_Crime_Incidents_per_Bias_Motivation_and_Quarter_</a:t>
             </a:r>
             <a:br>
               <a:rPr lang="en" sz="1500">
@@ -10563,53 +10616,7 @@
                 <a:cs typeface="Source Sans Pro"/>
                 <a:sym typeface="Source Sans Pro"/>
               </a:rPr>
-              <a:t>(Crime, Mental Health, Death Penalty) </a:t>
-            </a:r>
-            <a:br>
-              <a:rPr lang="en" sz="1500">
-                <a:solidFill>
-                  <a:schemeClr val="dk1"/>
-                </a:solidFill>
-                <a:latin typeface="Source Sans Pro"/>
-                <a:ea typeface="Source Sans Pro"/>
-                <a:cs typeface="Source Sans Pro"/>
-                <a:sym typeface="Source Sans Pro"/>
-              </a:rPr>
-            </a:br>
-            <a:r>
-              <a:rPr lang="en" sz="1500">
-                <a:solidFill>
-                  <a:schemeClr val="dk1"/>
-                </a:solidFill>
-                <a:latin typeface="Source Sans Pro"/>
-                <a:ea typeface="Source Sans Pro"/>
-                <a:cs typeface="Source Sans Pro"/>
-                <a:sym typeface="Source Sans Pro"/>
-              </a:rPr>
-              <a:t>so focused on choosing one dataset that interested </a:t>
-            </a:r>
-            <a:br>
-              <a:rPr lang="en" sz="1500">
-                <a:solidFill>
-                  <a:schemeClr val="dk1"/>
-                </a:solidFill>
-                <a:latin typeface="Source Sans Pro"/>
-                <a:ea typeface="Source Sans Pro"/>
-                <a:cs typeface="Source Sans Pro"/>
-                <a:sym typeface="Source Sans Pro"/>
-              </a:rPr>
-            </a:br>
-            <a:r>
-              <a:rPr lang="en" sz="1500">
-                <a:solidFill>
-                  <a:schemeClr val="dk1"/>
-                </a:solidFill>
-                <a:latin typeface="Source Sans Pro"/>
-                <a:ea typeface="Source Sans Pro"/>
-                <a:cs typeface="Source Sans Pro"/>
-                <a:sym typeface="Source Sans Pro"/>
-              </a:rPr>
-              <a:t>all team members enough to find questions each wanted to ask.</a:t>
+              <a:t>by_State_Federal_and_Agency_2019 dataset </a:t>
             </a:r>
             <a:endParaRPr sz="1500">
               <a:solidFill>
@@ -10633,93 +10640,6 @@
             </a:pPr>
             <a:r>
               <a:t/>
-            </a:r>
-            <a:endParaRPr sz="1500">
-              <a:solidFill>
-                <a:schemeClr val="dk1"/>
-              </a:solidFill>
-              <a:latin typeface="Source Sans Pro"/>
-              <a:ea typeface="Source Sans Pro"/>
-              <a:cs typeface="Source Sans Pro"/>
-              <a:sym typeface="Source Sans Pro"/>
-            </a:endParaRPr>
-          </a:p>
-          <a:p>
-            <a:pPr indent="0" lvl="0" marL="0" rtl="0" algn="ctr">
-              <a:spcBef>
-                <a:spcPts val="0"/>
-              </a:spcBef>
-              <a:spcAft>
-                <a:spcPts val="0"/>
-              </a:spcAft>
-              <a:buNone/>
-            </a:pPr>
-            <a:r>
-              <a:rPr lang="en" sz="1500">
-                <a:solidFill>
-                  <a:schemeClr val="dk1"/>
-                </a:solidFill>
-                <a:latin typeface="Source Sans Pro"/>
-                <a:ea typeface="Source Sans Pro"/>
-                <a:cs typeface="Source Sans Pro"/>
-                <a:sym typeface="Source Sans Pro"/>
-              </a:rPr>
-              <a:t>Dataset used for this project:</a:t>
-            </a:r>
-            <a:endParaRPr sz="1500">
-              <a:solidFill>
-                <a:schemeClr val="dk1"/>
-              </a:solidFill>
-              <a:latin typeface="Source Sans Pro"/>
-              <a:ea typeface="Source Sans Pro"/>
-              <a:cs typeface="Source Sans Pro"/>
-              <a:sym typeface="Source Sans Pro"/>
-            </a:endParaRPr>
-          </a:p>
-          <a:p>
-            <a:pPr indent="0" lvl="0" marL="0" rtl="0" algn="ctr">
-              <a:spcBef>
-                <a:spcPts val="0"/>
-              </a:spcBef>
-              <a:spcAft>
-                <a:spcPts val="0"/>
-              </a:spcAft>
-              <a:buNone/>
-            </a:pPr>
-            <a:r>
-              <a:rPr lang="en" sz="1500">
-                <a:solidFill>
-                  <a:schemeClr val="dk1"/>
-                </a:solidFill>
-                <a:latin typeface="Source Sans Pro"/>
-                <a:ea typeface="Source Sans Pro"/>
-                <a:cs typeface="Source Sans Pro"/>
-                <a:sym typeface="Source Sans Pro"/>
-              </a:rPr>
-              <a:t>Hate_Crime_Incidents_per_Bias_Motivation_and_Quarter_</a:t>
-            </a:r>
-            <a:br>
-              <a:rPr lang="en" sz="1500">
-                <a:solidFill>
-                  <a:schemeClr val="dk1"/>
-                </a:solidFill>
-                <a:latin typeface="Source Sans Pro"/>
-                <a:ea typeface="Source Sans Pro"/>
-                <a:cs typeface="Source Sans Pro"/>
-                <a:sym typeface="Source Sans Pro"/>
-              </a:rPr>
-            </a:br>
-            <a:r>
-              <a:rPr lang="en" sz="1500">
-                <a:solidFill>
-                  <a:schemeClr val="dk1"/>
-                </a:solidFill>
-                <a:latin typeface="Source Sans Pro"/>
-                <a:ea typeface="Source Sans Pro"/>
-                <a:cs typeface="Source Sans Pro"/>
-                <a:sym typeface="Source Sans Pro"/>
-              </a:rPr>
-              <a:t>by_State_Federal_and_Agency_2019 dataset </a:t>
             </a:r>
             <a:endParaRPr sz="1500">
               <a:solidFill>
@@ -10913,6 +10833,84 @@
             </a:pPr>
             <a:r>
               <a:t/>
+            </a:r>
+            <a:endParaRPr sz="1500">
+              <a:solidFill>
+                <a:schemeClr val="dk1"/>
+              </a:solidFill>
+              <a:latin typeface="Source Sans Pro"/>
+              <a:ea typeface="Source Sans Pro"/>
+              <a:cs typeface="Source Sans Pro"/>
+              <a:sym typeface="Source Sans Pro"/>
+            </a:endParaRPr>
+          </a:p>
+          <a:p>
+            <a:pPr indent="0" lvl="0" marL="0" rtl="0" algn="ctr">
+              <a:spcBef>
+                <a:spcPts val="0"/>
+              </a:spcBef>
+              <a:spcAft>
+                <a:spcPts val="0"/>
+              </a:spcAft>
+              <a:buNone/>
+            </a:pPr>
+            <a:r>
+              <a:rPr lang="en" sz="1500">
+                <a:solidFill>
+                  <a:schemeClr val="dk1"/>
+                </a:solidFill>
+                <a:latin typeface="Source Sans Pro"/>
+                <a:ea typeface="Source Sans Pro"/>
+                <a:cs typeface="Source Sans Pro"/>
+                <a:sym typeface="Source Sans Pro"/>
+              </a:rPr>
+              <a:t>Hate Crimes dataset details how many crimes per state, </a:t>
+            </a:r>
+            <a:br>
+              <a:rPr lang="en" sz="1500">
+                <a:solidFill>
+                  <a:schemeClr val="dk1"/>
+                </a:solidFill>
+                <a:latin typeface="Source Sans Pro"/>
+                <a:ea typeface="Source Sans Pro"/>
+                <a:cs typeface="Source Sans Pro"/>
+                <a:sym typeface="Source Sans Pro"/>
+              </a:rPr>
+            </a:br>
+            <a:r>
+              <a:rPr lang="en" sz="1500">
+                <a:solidFill>
+                  <a:schemeClr val="dk1"/>
+                </a:solidFill>
+                <a:latin typeface="Source Sans Pro"/>
+                <a:ea typeface="Source Sans Pro"/>
+                <a:cs typeface="Source Sans Pro"/>
+                <a:sym typeface="Source Sans Pro"/>
+              </a:rPr>
+              <a:t>classifying crimes by the motivating bias/target </a:t>
+            </a:r>
+            <a:br>
+              <a:rPr lang="en" sz="1500">
+                <a:solidFill>
+                  <a:schemeClr val="dk1"/>
+                </a:solidFill>
+                <a:latin typeface="Source Sans Pro"/>
+                <a:ea typeface="Source Sans Pro"/>
+                <a:cs typeface="Source Sans Pro"/>
+                <a:sym typeface="Source Sans Pro"/>
+              </a:rPr>
+            </a:br>
+            <a:r>
+              <a:rPr lang="en" sz="1500">
+                <a:solidFill>
+                  <a:schemeClr val="dk1"/>
+                </a:solidFill>
+                <a:latin typeface="Source Sans Pro"/>
+                <a:ea typeface="Source Sans Pro"/>
+                <a:cs typeface="Source Sans Pro"/>
+                <a:sym typeface="Source Sans Pro"/>
+              </a:rPr>
+              <a:t>(Race, Religion, Sexual Orientation, Gender, Gender ID, Disability).</a:t>
             </a:r>
             <a:endParaRPr sz="1500">
               <a:solidFill>
@@ -11010,7 +11008,7 @@
                   <a:schemeClr val="dk1"/>
                 </a:solidFill>
               </a:rPr>
-              <a:t>Initial Data &amp; Team Interests</a:t>
+              <a:t>Initial Dataset</a:t>
             </a:r>
             <a:endParaRPr sz="1777">
               <a:solidFill>
@@ -11144,7 +11142,7 @@
                   <a:schemeClr val="dk1"/>
                 </a:solidFill>
               </a:rPr>
-              <a:t>Sayira Furnish - Final Project</a:t>
+              <a:t>Data Wrangling (Python)</a:t>
             </a:r>
             <a:endParaRPr sz="1777">
               <a:solidFill>
@@ -11163,7 +11161,7 @@
         <p:spPr>
           <a:xfrm>
             <a:off x="3249400" y="771150"/>
-            <a:ext cx="5749800" cy="4340700"/>
+            <a:ext cx="5749800" cy="3879000"/>
           </a:xfrm>
           <a:prstGeom prst="rect">
             <a:avLst/>
@@ -11179,7 +11177,30 @@
           </a:bodyPr>
           <a:lstStyle/>
           <a:p>
-            <a:pPr indent="0" lvl="0" marL="0" rtl="0" algn="l">
+            <a:pPr indent="0" lvl="0" marL="0" rtl="0" algn="ctr">
+              <a:spcBef>
+                <a:spcPts val="0"/>
+              </a:spcBef>
+              <a:spcAft>
+                <a:spcPts val="0"/>
+              </a:spcAft>
+              <a:buNone/>
+            </a:pPr>
+            <a:r>
+              <a:t/>
+            </a:r>
+            <a:endParaRPr sz="1500">
+              <a:solidFill>
+                <a:schemeClr val="dk1"/>
+              </a:solidFill>
+              <a:latin typeface="Source Sans Pro"/>
+              <a:ea typeface="Source Sans Pro"/>
+              <a:cs typeface="Source Sans Pro"/>
+              <a:sym typeface="Source Sans Pro"/>
+            </a:endParaRPr>
+          </a:p>
+          <a:p>
+            <a:pPr indent="0" lvl="0" marL="0" rtl="0" algn="ctr">
               <a:spcBef>
                 <a:spcPts val="0"/>
               </a:spcBef>
@@ -11198,43 +11219,20 @@
                 <a:cs typeface="Source Sans Pro"/>
                 <a:sym typeface="Source Sans Pro"/>
               </a:rPr>
-              <a:t>Hate Crimes dataset detailed how many crimes per state, defining crimes by the motivating target (Race, Religion, Sexual Orientation, Gender, Gender ID, Disability).</a:t>
-            </a:r>
-            <a:endParaRPr sz="1500">
-              <a:solidFill>
-                <a:schemeClr val="dk1"/>
-              </a:solidFill>
-              <a:latin typeface="Source Sans Pro"/>
-              <a:ea typeface="Source Sans Pro"/>
-              <a:cs typeface="Source Sans Pro"/>
-              <a:sym typeface="Source Sans Pro"/>
-            </a:endParaRPr>
-          </a:p>
-          <a:p>
-            <a:pPr indent="0" lvl="0" marL="0" rtl="0" algn="l">
-              <a:spcBef>
-                <a:spcPts val="0"/>
-              </a:spcBef>
-              <a:spcAft>
-                <a:spcPts val="0"/>
-              </a:spcAft>
-              <a:buNone/>
-            </a:pPr>
-            <a:r>
-              <a:t/>
-            </a:r>
-            <a:endParaRPr sz="1500">
-              <a:solidFill>
-                <a:schemeClr val="dk1"/>
-              </a:solidFill>
-              <a:latin typeface="Source Sans Pro"/>
-              <a:ea typeface="Source Sans Pro"/>
-              <a:cs typeface="Source Sans Pro"/>
-              <a:sym typeface="Source Sans Pro"/>
-            </a:endParaRPr>
-          </a:p>
-          <a:p>
-            <a:pPr indent="0" lvl="0" marL="0" rtl="0" algn="l">
+              <a:t>Data Wrangling opens new opportunities for questions.  </a:t>
+            </a:r>
+            <a:endParaRPr sz="1500">
+              <a:solidFill>
+                <a:schemeClr val="dk1"/>
+              </a:solidFill>
+              <a:latin typeface="Source Sans Pro"/>
+              <a:ea typeface="Source Sans Pro"/>
+              <a:cs typeface="Source Sans Pro"/>
+              <a:sym typeface="Source Sans Pro"/>
+            </a:endParaRPr>
+          </a:p>
+          <a:p>
+            <a:pPr indent="0" lvl="0" marL="0" rtl="0" algn="ctr">
               <a:spcBef>
                 <a:spcPts val="0"/>
               </a:spcBef>
@@ -11253,20 +11251,20 @@
                 <a:cs typeface="Source Sans Pro"/>
                 <a:sym typeface="Source Sans Pro"/>
               </a:rPr>
-              <a:t>As reviewed the dataset, found myself asking what would see if pulled demographic data in, opening door to these 2 questions:</a:t>
-            </a:r>
-            <a:endParaRPr sz="1500">
-              <a:solidFill>
-                <a:schemeClr val="dk1"/>
-              </a:solidFill>
-              <a:latin typeface="Source Sans Pro"/>
-              <a:ea typeface="Source Sans Pro"/>
-              <a:cs typeface="Source Sans Pro"/>
-              <a:sym typeface="Source Sans Pro"/>
-            </a:endParaRPr>
-          </a:p>
-          <a:p>
-            <a:pPr indent="0" lvl="0" marL="0" rtl="0" algn="l">
+              <a:t>Multiple nulls led to pulling additional demographic data which opened door to these 2 questions:</a:t>
+            </a:r>
+            <a:endParaRPr sz="1500">
+              <a:solidFill>
+                <a:schemeClr val="dk1"/>
+              </a:solidFill>
+              <a:latin typeface="Source Sans Pro"/>
+              <a:ea typeface="Source Sans Pro"/>
+              <a:cs typeface="Source Sans Pro"/>
+              <a:sym typeface="Source Sans Pro"/>
+            </a:endParaRPr>
+          </a:p>
+          <a:p>
+            <a:pPr indent="0" lvl="0" marL="0" rtl="0" algn="ctr">
               <a:spcBef>
                 <a:spcPts val="0"/>
               </a:spcBef>
@@ -11289,7 +11287,7 @@
             </a:endParaRPr>
           </a:p>
           <a:p>
-            <a:pPr indent="-323850" lvl="0" marL="457200" rtl="0" algn="l">
+            <a:pPr indent="-323850" lvl="0" marL="457200" rtl="0" algn="ctr">
               <a:spcBef>
                 <a:spcPts val="0"/>
               </a:spcBef>
@@ -11313,32 +11311,27 @@
                 <a:cs typeface="Source Sans Pro"/>
                 <a:sym typeface="Source Sans Pro"/>
               </a:rPr>
-              <a:t>How does demographic makeup of a state affect types of Hate Crimes committed?</a:t>
-            </a:r>
-            <a:endParaRPr sz="1500">
-              <a:solidFill>
-                <a:schemeClr val="dk1"/>
-              </a:solidFill>
-              <a:latin typeface="Source Sans Pro"/>
-              <a:ea typeface="Source Sans Pro"/>
-              <a:cs typeface="Source Sans Pro"/>
-              <a:sym typeface="Source Sans Pro"/>
-            </a:endParaRPr>
-          </a:p>
-          <a:p>
-            <a:pPr indent="-323850" lvl="0" marL="457200" rtl="0" algn="l">
-              <a:spcBef>
-                <a:spcPts val="0"/>
-              </a:spcBef>
-              <a:spcAft>
-                <a:spcPts val="0"/>
-              </a:spcAft>
-              <a:buClr>
-                <a:schemeClr val="dk1"/>
-              </a:buClr>
-              <a:buSzPts val="1500"/>
-              <a:buFont typeface="Source Sans Pro"/>
-              <a:buAutoNum type="arabicParenR"/>
+              <a:t>How does demographic makeup of a state </a:t>
+            </a:r>
+            <a:endParaRPr sz="1500">
+              <a:solidFill>
+                <a:schemeClr val="dk1"/>
+              </a:solidFill>
+              <a:latin typeface="Source Sans Pro"/>
+              <a:ea typeface="Source Sans Pro"/>
+              <a:cs typeface="Source Sans Pro"/>
+              <a:sym typeface="Source Sans Pro"/>
+            </a:endParaRPr>
+          </a:p>
+          <a:p>
+            <a:pPr indent="0" lvl="0" marL="457200" rtl="0" algn="ctr">
+              <a:spcBef>
+                <a:spcPts val="0"/>
+              </a:spcBef>
+              <a:spcAft>
+                <a:spcPts val="0"/>
+              </a:spcAft>
+              <a:buNone/>
             </a:pPr>
             <a:r>
               <a:rPr lang="en" sz="1500">
@@ -11350,20 +11343,20 @@
                 <a:cs typeface="Source Sans Pro"/>
                 <a:sym typeface="Source Sans Pro"/>
               </a:rPr>
-              <a:t>How does demographic makeup of a state affect the # of Hate Crimes committed?</a:t>
-            </a:r>
-            <a:endParaRPr sz="1500">
-              <a:solidFill>
-                <a:schemeClr val="dk1"/>
-              </a:solidFill>
-              <a:latin typeface="Source Sans Pro"/>
-              <a:ea typeface="Source Sans Pro"/>
-              <a:cs typeface="Source Sans Pro"/>
-              <a:sym typeface="Source Sans Pro"/>
-            </a:endParaRPr>
-          </a:p>
-          <a:p>
-            <a:pPr indent="0" lvl="0" marL="0" rtl="0" algn="l">
+              <a:t>affect the # of Hate Crimes committed?</a:t>
+            </a:r>
+            <a:endParaRPr sz="1500">
+              <a:solidFill>
+                <a:schemeClr val="dk1"/>
+              </a:solidFill>
+              <a:latin typeface="Source Sans Pro"/>
+              <a:ea typeface="Source Sans Pro"/>
+              <a:cs typeface="Source Sans Pro"/>
+              <a:sym typeface="Source Sans Pro"/>
+            </a:endParaRPr>
+          </a:p>
+          <a:p>
+            <a:pPr indent="0" lvl="0" marL="457200" rtl="0" algn="ctr">
               <a:spcBef>
                 <a:spcPts val="0"/>
               </a:spcBef>
@@ -11386,14 +11379,19 @@
             </a:endParaRPr>
           </a:p>
           <a:p>
-            <a:pPr indent="0" lvl="0" marL="0" rtl="0" algn="l">
-              <a:spcBef>
-                <a:spcPts val="0"/>
-              </a:spcBef>
-              <a:spcAft>
-                <a:spcPts val="0"/>
-              </a:spcAft>
-              <a:buNone/>
+            <a:pPr indent="-323850" lvl="0" marL="457200" rtl="0" algn="ctr">
+              <a:spcBef>
+                <a:spcPts val="0"/>
+              </a:spcBef>
+              <a:spcAft>
+                <a:spcPts val="0"/>
+              </a:spcAft>
+              <a:buClr>
+                <a:schemeClr val="dk1"/>
+              </a:buClr>
+              <a:buSzPts val="1500"/>
+              <a:buFont typeface="Source Sans Pro"/>
+              <a:buAutoNum type="arabicParenR"/>
             </a:pPr>
             <a:r>
               <a:rPr lang="en" sz="1500">
@@ -11405,7 +11403,94 @@
                 <a:cs typeface="Source Sans Pro"/>
                 <a:sym typeface="Source Sans Pro"/>
               </a:rPr>
-              <a:t>This led to the US Census site’s State Visualizations of Key Demographic Trends from the 2020 Census: </a:t>
+              <a:t>How does demographic makeup of a state </a:t>
+            </a:r>
+            <a:endParaRPr sz="1500">
+              <a:solidFill>
+                <a:schemeClr val="dk1"/>
+              </a:solidFill>
+              <a:latin typeface="Source Sans Pro"/>
+              <a:ea typeface="Source Sans Pro"/>
+              <a:cs typeface="Source Sans Pro"/>
+              <a:sym typeface="Source Sans Pro"/>
+            </a:endParaRPr>
+          </a:p>
+          <a:p>
+            <a:pPr indent="0" lvl="0" marL="457200" rtl="0" algn="ctr">
+              <a:spcBef>
+                <a:spcPts val="0"/>
+              </a:spcBef>
+              <a:spcAft>
+                <a:spcPts val="0"/>
+              </a:spcAft>
+              <a:buNone/>
+            </a:pPr>
+            <a:r>
+              <a:rPr lang="en" sz="1500">
+                <a:solidFill>
+                  <a:schemeClr val="dk1"/>
+                </a:solidFill>
+                <a:latin typeface="Source Sans Pro"/>
+                <a:ea typeface="Source Sans Pro"/>
+                <a:cs typeface="Source Sans Pro"/>
+                <a:sym typeface="Source Sans Pro"/>
+              </a:rPr>
+              <a:t>affect the types of Hate Crimes committed?</a:t>
+            </a:r>
+            <a:endParaRPr sz="1500">
+              <a:solidFill>
+                <a:schemeClr val="dk1"/>
+              </a:solidFill>
+              <a:latin typeface="Source Sans Pro"/>
+              <a:ea typeface="Source Sans Pro"/>
+              <a:cs typeface="Source Sans Pro"/>
+              <a:sym typeface="Source Sans Pro"/>
+            </a:endParaRPr>
+          </a:p>
+          <a:p>
+            <a:pPr indent="0" lvl="0" marL="0" rtl="0" algn="ctr">
+              <a:spcBef>
+                <a:spcPts val="0"/>
+              </a:spcBef>
+              <a:spcAft>
+                <a:spcPts val="0"/>
+              </a:spcAft>
+              <a:buNone/>
+            </a:pPr>
+            <a:r>
+              <a:t/>
+            </a:r>
+            <a:endParaRPr sz="1500">
+              <a:solidFill>
+                <a:schemeClr val="dk1"/>
+              </a:solidFill>
+              <a:latin typeface="Source Sans Pro"/>
+              <a:ea typeface="Source Sans Pro"/>
+              <a:cs typeface="Source Sans Pro"/>
+              <a:sym typeface="Source Sans Pro"/>
+            </a:endParaRPr>
+          </a:p>
+          <a:p>
+            <a:pPr indent="0" lvl="0" marL="0" rtl="0" algn="ctr">
+              <a:spcBef>
+                <a:spcPts val="0"/>
+              </a:spcBef>
+              <a:spcAft>
+                <a:spcPts val="0"/>
+              </a:spcAft>
+              <a:buNone/>
+            </a:pPr>
+            <a:r>
+              <a:rPr lang="en" sz="1500">
+                <a:solidFill>
+                  <a:schemeClr val="dk1"/>
+                </a:solidFill>
+                <a:latin typeface="Source Sans Pro"/>
+                <a:ea typeface="Source Sans Pro"/>
+                <a:cs typeface="Source Sans Pro"/>
+                <a:sym typeface="Source Sans Pro"/>
+              </a:rPr>
+              <a:t>Additional data pulled from US Census site’s State Visualizations of Key Demographic Trends from the 2020 Census: </a:t>
             </a:r>
             <a:r>
               <a:rPr lang="en" sz="1500" u="sng">
@@ -11443,7 +11528,7 @@
             </a:endParaRPr>
           </a:p>
           <a:p>
-            <a:pPr indent="0" lvl="0" marL="0" rtl="0" algn="l">
+            <a:pPr indent="0" lvl="0" marL="0" rtl="0" algn="ctr">
               <a:spcBef>
                 <a:spcPts val="0"/>
               </a:spcBef>
@@ -11466,26 +11551,17 @@
             </a:endParaRPr>
           </a:p>
           <a:p>
-            <a:pPr indent="0" lvl="0" marL="0" rtl="0" algn="l">
-              <a:spcBef>
-                <a:spcPts val="0"/>
-              </a:spcBef>
-              <a:spcAft>
-                <a:spcPts val="0"/>
-              </a:spcAft>
-              <a:buNone/>
-            </a:pPr>
-            <a:r>
-              <a:rPr lang="en" sz="1500">
-                <a:solidFill>
-                  <a:schemeClr val="dk1"/>
-                </a:solidFill>
-                <a:latin typeface="Source Sans Pro"/>
-                <a:ea typeface="Source Sans Pro"/>
-                <a:cs typeface="Source Sans Pro"/>
-                <a:sym typeface="Source Sans Pro"/>
-              </a:rPr>
-              <a:t>Using data pulled from this site, a 2nd dataset was built and included in the data wrangling.</a:t>
+            <a:pPr indent="0" lvl="0" marL="0" rtl="0" algn="ctr">
+              <a:spcBef>
+                <a:spcPts val="0"/>
+              </a:spcBef>
+              <a:spcAft>
+                <a:spcPts val="0"/>
+              </a:spcAft>
+              <a:buNone/>
+            </a:pPr>
+            <a:r>
+              <a:t/>
             </a:r>
             <a:endParaRPr sz="1500">
               <a:solidFill>
@@ -11642,7 +11718,7 @@
         <p:spPr>
           <a:xfrm>
             <a:off x="3249400" y="771150"/>
-            <a:ext cx="5749800" cy="3879000"/>
+            <a:ext cx="5749800" cy="4109700"/>
           </a:xfrm>
           <a:prstGeom prst="rect">
             <a:avLst/>
@@ -11742,7 +11818,7 @@
                 <a:cs typeface="Source Sans Pro"/>
                 <a:sym typeface="Source Sans Pro"/>
               </a:rPr>
-              <a:t>When looked to collect missing data directly from source site, found there was no Alabama data reported for 2019</a:t>
+              <a:t>No Alabama data reported for 2019</a:t>
             </a:r>
             <a:endParaRPr sz="1500">
               <a:solidFill>
@@ -11816,7 +11892,30 @@
                 <a:cs typeface="Source Sans Pro"/>
                 <a:sym typeface="Source Sans Pro"/>
               </a:rPr>
-              <a:t>Did not include Alabama in build of demographics dataset</a:t>
+              <a:t>Chose to not include Alabama in build of demographics dataset</a:t>
+            </a:r>
+            <a:endParaRPr sz="1500">
+              <a:solidFill>
+                <a:schemeClr val="dk1"/>
+              </a:solidFill>
+              <a:latin typeface="Source Sans Pro"/>
+              <a:ea typeface="Source Sans Pro"/>
+              <a:cs typeface="Source Sans Pro"/>
+              <a:sym typeface="Source Sans Pro"/>
+            </a:endParaRPr>
+          </a:p>
+          <a:p>
+            <a:pPr indent="0" lvl="0" marL="914400" rtl="0" algn="l">
+              <a:spcBef>
+                <a:spcPts val="0"/>
+              </a:spcBef>
+              <a:spcAft>
+                <a:spcPts val="0"/>
+              </a:spcAft>
+              <a:buNone/>
+            </a:pPr>
+            <a:r>
+              <a:t/>
             </a:r>
             <a:endParaRPr sz="1500">
               <a:solidFill>
@@ -11876,32 +11975,27 @@
                 <a:cs typeface="Source Sans Pro"/>
                 <a:sym typeface="Source Sans Pro"/>
               </a:rPr>
-              <a:t>US Census site provided State, race percentages per state, and state population</a:t>
-            </a:r>
-            <a:endParaRPr sz="1500">
-              <a:solidFill>
-                <a:schemeClr val="dk1"/>
-              </a:solidFill>
-              <a:latin typeface="Source Sans Pro"/>
-              <a:ea typeface="Source Sans Pro"/>
-              <a:cs typeface="Source Sans Pro"/>
-              <a:sym typeface="Source Sans Pro"/>
-            </a:endParaRPr>
-          </a:p>
-          <a:p>
-            <a:pPr indent="-323850" lvl="1" marL="914400" rtl="0" algn="l">
-              <a:spcBef>
-                <a:spcPts val="0"/>
-              </a:spcBef>
-              <a:spcAft>
-                <a:spcPts val="0"/>
-              </a:spcAft>
-              <a:buClr>
-                <a:schemeClr val="dk1"/>
-              </a:buClr>
-              <a:buSzPts val="1500"/>
-              <a:buFont typeface="Source Sans Pro"/>
-              <a:buChar char="-"/>
+              <a:t>US Census site provided state population numbers, and </a:t>
+            </a:r>
+            <a:endParaRPr sz="1500">
+              <a:solidFill>
+                <a:schemeClr val="dk1"/>
+              </a:solidFill>
+              <a:latin typeface="Source Sans Pro"/>
+              <a:ea typeface="Source Sans Pro"/>
+              <a:cs typeface="Source Sans Pro"/>
+              <a:sym typeface="Source Sans Pro"/>
+            </a:endParaRPr>
+          </a:p>
+          <a:p>
+            <a:pPr indent="0" lvl="0" marL="457200" rtl="0" algn="l">
+              <a:spcBef>
+                <a:spcPts val="0"/>
+              </a:spcBef>
+              <a:spcAft>
+                <a:spcPts val="0"/>
+              </a:spcAft>
+              <a:buNone/>
             </a:pPr>
             <a:r>
               <a:rPr lang="en" sz="1500">
@@ -11913,7 +12007,108 @@
                 <a:cs typeface="Source Sans Pro"/>
                 <a:sym typeface="Source Sans Pro"/>
               </a:rPr>
-              <a:t>Set up equations for spreadsheet to calculate population #s for each race classification based on state population and race percentages</a:t>
+              <a:t>race as percentages per state </a:t>
+            </a:r>
+            <a:endParaRPr sz="1500">
+              <a:solidFill>
+                <a:schemeClr val="dk1"/>
+              </a:solidFill>
+              <a:latin typeface="Source Sans Pro"/>
+              <a:ea typeface="Source Sans Pro"/>
+              <a:cs typeface="Source Sans Pro"/>
+              <a:sym typeface="Source Sans Pro"/>
+            </a:endParaRPr>
+          </a:p>
+          <a:p>
+            <a:pPr indent="-323850" lvl="1" marL="914400" rtl="0" algn="l">
+              <a:spcBef>
+                <a:spcPts val="0"/>
+              </a:spcBef>
+              <a:spcAft>
+                <a:spcPts val="0"/>
+              </a:spcAft>
+              <a:buClr>
+                <a:schemeClr val="dk1"/>
+              </a:buClr>
+              <a:buSzPts val="1500"/>
+              <a:buFont typeface="Source Sans Pro"/>
+              <a:buChar char="-"/>
+            </a:pPr>
+            <a:r>
+              <a:rPr lang="en" sz="1500">
+                <a:solidFill>
+                  <a:schemeClr val="dk1"/>
+                </a:solidFill>
+                <a:latin typeface="Source Sans Pro"/>
+                <a:ea typeface="Source Sans Pro"/>
+                <a:cs typeface="Source Sans Pro"/>
+                <a:sym typeface="Source Sans Pro"/>
+              </a:rPr>
+              <a:t>Equations in spreadsheet calculate population #s </a:t>
+            </a:r>
+            <a:endParaRPr sz="1500">
+              <a:solidFill>
+                <a:schemeClr val="dk1"/>
+              </a:solidFill>
+              <a:latin typeface="Source Sans Pro"/>
+              <a:ea typeface="Source Sans Pro"/>
+              <a:cs typeface="Source Sans Pro"/>
+              <a:sym typeface="Source Sans Pro"/>
+            </a:endParaRPr>
+          </a:p>
+          <a:p>
+            <a:pPr indent="0" lvl="0" marL="914400" rtl="0" algn="l">
+              <a:spcBef>
+                <a:spcPts val="0"/>
+              </a:spcBef>
+              <a:spcAft>
+                <a:spcPts val="0"/>
+              </a:spcAft>
+              <a:buNone/>
+            </a:pPr>
+            <a:r>
+              <a:rPr lang="en" sz="1500">
+                <a:solidFill>
+                  <a:schemeClr val="dk1"/>
+                </a:solidFill>
+                <a:latin typeface="Source Sans Pro"/>
+                <a:ea typeface="Source Sans Pro"/>
+                <a:cs typeface="Source Sans Pro"/>
+                <a:sym typeface="Source Sans Pro"/>
+              </a:rPr>
+              <a:t>for each race based on state population </a:t>
+            </a:r>
+            <a:endParaRPr sz="1500">
+              <a:solidFill>
+                <a:schemeClr val="dk1"/>
+              </a:solidFill>
+              <a:latin typeface="Source Sans Pro"/>
+              <a:ea typeface="Source Sans Pro"/>
+              <a:cs typeface="Source Sans Pro"/>
+              <a:sym typeface="Source Sans Pro"/>
+            </a:endParaRPr>
+          </a:p>
+          <a:p>
+            <a:pPr indent="0" lvl="0" marL="914400" rtl="0" algn="l">
+              <a:spcBef>
+                <a:spcPts val="0"/>
+              </a:spcBef>
+              <a:spcAft>
+                <a:spcPts val="0"/>
+              </a:spcAft>
+              <a:buNone/>
+            </a:pPr>
+            <a:r>
+              <a:rPr lang="en" sz="1500">
+                <a:solidFill>
+                  <a:schemeClr val="dk1"/>
+                </a:solidFill>
+                <a:latin typeface="Source Sans Pro"/>
+                <a:ea typeface="Source Sans Pro"/>
+                <a:cs typeface="Source Sans Pro"/>
+                <a:sym typeface="Source Sans Pro"/>
+              </a:rPr>
+              <a:t>and race percentages</a:t>
             </a:r>
             <a:endParaRPr sz="1500">
               <a:solidFill>
@@ -12147,7 +12342,7 @@
         <p:spPr>
           <a:xfrm>
             <a:off x="119900" y="861025"/>
-            <a:ext cx="2919900" cy="3879000"/>
+            <a:ext cx="2919900" cy="4571400"/>
           </a:xfrm>
           <a:prstGeom prst="rect">
             <a:avLst/>
@@ -12173,6 +12368,29 @@
               <a:buNone/>
             </a:pPr>
             <a:r>
+              <a:t/>
+            </a:r>
+            <a:endParaRPr sz="1500">
+              <a:solidFill>
+                <a:schemeClr val="dk1"/>
+              </a:solidFill>
+              <a:latin typeface="Source Sans Pro"/>
+              <a:ea typeface="Source Sans Pro"/>
+              <a:cs typeface="Source Sans Pro"/>
+              <a:sym typeface="Source Sans Pro"/>
+            </a:endParaRPr>
+          </a:p>
+          <a:p>
+            <a:pPr indent="0" lvl="0" marL="0" rtl="0" algn="ctr">
+              <a:spcBef>
+                <a:spcPts val="0"/>
+              </a:spcBef>
+              <a:spcAft>
+                <a:spcPts val="0"/>
+              </a:spcAft>
+              <a:buNone/>
+            </a:pPr>
+            <a:r>
               <a:rPr lang="en" sz="1500">
                 <a:solidFill>
                   <a:schemeClr val="dk1"/>
@@ -12260,6 +12478,29 @@
               <a:buNone/>
             </a:pPr>
             <a:r>
+              <a:t/>
+            </a:r>
+            <a:endParaRPr sz="1500">
+              <a:solidFill>
+                <a:schemeClr val="dk1"/>
+              </a:solidFill>
+              <a:latin typeface="Source Sans Pro"/>
+              <a:ea typeface="Source Sans Pro"/>
+              <a:cs typeface="Source Sans Pro"/>
+              <a:sym typeface="Source Sans Pro"/>
+            </a:endParaRPr>
+          </a:p>
+          <a:p>
+            <a:pPr indent="0" lvl="0" marL="0" rtl="0" algn="ctr">
+              <a:spcBef>
+                <a:spcPts val="0"/>
+              </a:spcBef>
+              <a:spcAft>
+                <a:spcPts val="0"/>
+              </a:spcAft>
+              <a:buNone/>
+            </a:pPr>
+            <a:r>
               <a:rPr lang="en" sz="1500">
                 <a:solidFill>
                   <a:schemeClr val="dk1"/>
@@ -12269,7 +12510,30 @@
                 <a:cs typeface="Source Sans Pro"/>
                 <a:sym typeface="Source Sans Pro"/>
               </a:rPr>
-              <a:t>First ran without heatmap - useful because all digits are legible.</a:t>
+              <a:t>Version without heatmap (in code) - useful because digits are legible.</a:t>
+            </a:r>
+            <a:endParaRPr sz="1500">
+              <a:solidFill>
+                <a:schemeClr val="dk1"/>
+              </a:solidFill>
+              <a:latin typeface="Source Sans Pro"/>
+              <a:ea typeface="Source Sans Pro"/>
+              <a:cs typeface="Source Sans Pro"/>
+              <a:sym typeface="Source Sans Pro"/>
+            </a:endParaRPr>
+          </a:p>
+          <a:p>
+            <a:pPr indent="0" lvl="0" marL="0" rtl="0" algn="ctr">
+              <a:spcBef>
+                <a:spcPts val="0"/>
+              </a:spcBef>
+              <a:spcAft>
+                <a:spcPts val="0"/>
+              </a:spcAft>
+              <a:buNone/>
+            </a:pPr>
+            <a:r>
+              <a:t/>
             </a:r>
             <a:endParaRPr sz="1500">
               <a:solidFill>
@@ -12324,7 +12588,7 @@
                 <a:cs typeface="Source Sans Pro"/>
                 <a:sym typeface="Source Sans Pro"/>
               </a:rPr>
-              <a:t>Then ran with heatmap. While the digits are not as legible, the colors help clarify the correlation spread and make it easy to pinpoint areas of interest.</a:t>
+              <a:t>Version with heatmap (seen here). While the digits are not as legible, the colors help clarify the correlation spread and make it easy to pinpoint areas of interest.</a:t>
             </a:r>
             <a:endParaRPr sz="1500">
               <a:solidFill>
@@ -14815,8 +15079,8 @@
         </p:blipFill>
         <p:spPr>
           <a:xfrm>
-            <a:off x="1647067" y="66675"/>
-            <a:ext cx="7455583" cy="5024400"/>
+            <a:off x="1759256" y="66675"/>
+            <a:ext cx="7343393" cy="4948799"/>
           </a:xfrm>
           <a:prstGeom prst="rect">
             <a:avLst/>
@@ -14836,6 +15100,285 @@
 </file>
 
 <file path=ppt/theme/theme1.xml><?xml version="1.0" encoding="utf-8"?>
+<a:theme xmlns:a="http://schemas.openxmlformats.org/drawingml/2006/main" xmlns:r="http://schemas.openxmlformats.org/officeDocument/2006/relationships" name="Simple Dark">
+  <a:themeElements>
+    <a:clrScheme name="Simple Dark">
+      <a:dk1>
+        <a:srgbClr val="FFFFFF"/>
+      </a:dk1>
+      <a:lt1>
+        <a:srgbClr val="212121"/>
+      </a:lt1>
+      <a:dk2>
+        <a:srgbClr val="303030"/>
+      </a:dk2>
+      <a:lt2>
+        <a:srgbClr val="ADADAD"/>
+      </a:lt2>
+      <a:accent1>
+        <a:srgbClr val="009688"/>
+      </a:accent1>
+      <a:accent2>
+        <a:srgbClr val="EEEEEE"/>
+      </a:accent2>
+      <a:accent3>
+        <a:srgbClr val="78909C"/>
+      </a:accent3>
+      <a:accent4>
+        <a:srgbClr val="FFAB40"/>
+      </a:accent4>
+      <a:accent5>
+        <a:srgbClr val="4DD0E1"/>
+      </a:accent5>
+      <a:accent6>
+        <a:srgbClr val="EEFF41"/>
+      </a:accent6>
+      <a:hlink>
+        <a:srgbClr val="4DD0E1"/>
+      </a:hlink>
+      <a:folHlink>
+        <a:srgbClr val="4DD0E1"/>
+      </a:folHlink>
+    </a:clrScheme>
+    <a:fontScheme name="Office">
+      <a:majorFont>
+        <a:latin typeface="Arial"/>
+        <a:ea typeface=""/>
+        <a:cs typeface=""/>
+        <a:font script="Jpan" typeface="ＭＳ Ｐゴシック"/>
+        <a:font script="Hang" typeface="맑은 고딕"/>
+        <a:font script="Hans" typeface="宋体"/>
+        <a:font script="Hant" typeface="新細明體"/>
+        <a:font script="Arab" typeface="Times New Roman"/>
+        <a:font script="Hebr" typeface="Times New Roman"/>
+        <a:font script="Thai" typeface="Angsana New"/>
+        <a:font script="Ethi" typeface="Nyala"/>
+        <a:font script="Beng" typeface="Vrinda"/>
+        <a:font script="Gujr" typeface="Shruti"/>
+        <a:font script="Khmr" typeface="MoolBoran"/>
+        <a:font script="Knda" typeface="Tunga"/>
+        <a:font script="Guru" typeface="Raavi"/>
+        <a:font script="Cans" typeface="Euphemia"/>
+        <a:font script="Cher" typeface="Plantagenet Cherokee"/>
+        <a:font script="Yiii" typeface="Microsoft Yi Baiti"/>
+        <a:font script="Tibt" typeface="Microsoft Himalaya"/>
+        <a:font script="Thaa" typeface="MV Boli"/>
+        <a:font script="Deva" typeface="Mangal"/>
+        <a:font script="Telu" typeface="Gautami"/>
+        <a:font script="Taml" typeface="Latha"/>
+        <a:font script="Syrc" typeface="Estrangelo Edessa"/>
+        <a:font script="Orya" typeface="Kalinga"/>
+        <a:font script="Mlym" typeface="Kartika"/>
+        <a:font script="Laoo" typeface="DokChampa"/>
+        <a:font script="Sinh" typeface="Iskoola Pota"/>
+        <a:font script="Mong" typeface="Mongolian Baiti"/>
+        <a:font script="Viet" typeface="Times New Roman"/>
+        <a:font script="Uigh" typeface="Microsoft Uighur"/>
+        <a:font script="Geor" typeface="Sylfaen"/>
+      </a:majorFont>
+      <a:minorFont>
+        <a:latin typeface="Arial"/>
+        <a:ea typeface=""/>
+        <a:cs typeface=""/>
+        <a:font script="Jpan" typeface="ＭＳ Ｐゴシック"/>
+        <a:font script="Hang" typeface="맑은 고딕"/>
+        <a:font script="Hans" typeface="宋体"/>
+        <a:font script="Hant" typeface="新細明體"/>
+        <a:font script="Arab" typeface="Arial"/>
+        <a:font script="Hebr" typeface="Arial"/>
+        <a:font script="Thai" typeface="Cordia New"/>
+        <a:font script="Ethi" typeface="Nyala"/>
+        <a:font script="Beng" typeface="Vrinda"/>
+        <a:font script="Gujr" typeface="Shruti"/>
+        <a:font script="Khmr" typeface="DaunPenh"/>
+        <a:font script="Knda" typeface="Tunga"/>
+        <a:font script="Guru" typeface="Raavi"/>
+        <a:font script="Cans" typeface="Euphemia"/>
+        <a:font script="Cher" typeface="Plantagenet Cherokee"/>
+        <a:font script="Yiii" typeface="Microsoft Yi Baiti"/>
+        <a:font script="Tibt" typeface="Microsoft Himalaya"/>
+        <a:font script="Thaa" typeface="MV Boli"/>
+        <a:font script="Deva" typeface="Mangal"/>
+        <a:font script="Telu" typeface="Gautami"/>
+        <a:font script="Taml" typeface="Latha"/>
+        <a:font script="Syrc" typeface="Estrangelo Edessa"/>
+        <a:font script="Orya" typeface="Kalinga"/>
+        <a:font script="Mlym" typeface="Kartika"/>
+        <a:font script="Laoo" typeface="DokChampa"/>
+        <a:font script="Sinh" typeface="Iskoola Pota"/>
+        <a:font script="Mong" typeface="Mongolian Baiti"/>
+        <a:font script="Viet" typeface="Arial"/>
+        <a:font script="Uigh" typeface="Microsoft Uighur"/>
+        <a:font script="Geor" typeface="Sylfaen"/>
+      </a:minorFont>
+    </a:fontScheme>
+    <a:fmtScheme name="Office">
+      <a:fillStyleLst>
+        <a:solidFill>
+          <a:schemeClr val="phClr"/>
+        </a:solidFill>
+        <a:gradFill rotWithShape="1">
+          <a:gsLst>
+            <a:gs pos="0">
+              <a:schemeClr val="phClr">
+                <a:tint val="50000"/>
+                <a:satMod val="300000"/>
+              </a:schemeClr>
+            </a:gs>
+            <a:gs pos="35000">
+              <a:schemeClr val="phClr">
+                <a:tint val="37000"/>
+                <a:satMod val="300000"/>
+              </a:schemeClr>
+            </a:gs>
+            <a:gs pos="100000">
+              <a:schemeClr val="phClr">
+                <a:tint val="15000"/>
+                <a:satMod val="350000"/>
+              </a:schemeClr>
+            </a:gs>
+          </a:gsLst>
+          <a:lin ang="16200000" scaled="1"/>
+        </a:gradFill>
+        <a:gradFill rotWithShape="1">
+          <a:gsLst>
+            <a:gs pos="0">
+              <a:schemeClr val="phClr">
+                <a:tint val="100000"/>
+                <a:shade val="100000"/>
+                <a:satMod val="130000"/>
+              </a:schemeClr>
+            </a:gs>
+            <a:gs pos="100000">
+              <a:schemeClr val="phClr">
+                <a:tint val="50000"/>
+                <a:shade val="100000"/>
+                <a:satMod val="350000"/>
+              </a:schemeClr>
+            </a:gs>
+          </a:gsLst>
+          <a:lin ang="16200000" scaled="0"/>
+        </a:gradFill>
+      </a:fillStyleLst>
+      <a:lnStyleLst>
+        <a:ln w="9525" cap="flat" cmpd="sng" algn="ctr">
+          <a:solidFill>
+            <a:schemeClr val="phClr">
+              <a:shade val="95000"/>
+              <a:satMod val="105000"/>
+            </a:schemeClr>
+          </a:solidFill>
+          <a:prstDash val="solid"/>
+        </a:ln>
+        <a:ln w="25400" cap="flat" cmpd="sng" algn="ctr">
+          <a:solidFill>
+            <a:schemeClr val="phClr"/>
+          </a:solidFill>
+          <a:prstDash val="solid"/>
+        </a:ln>
+        <a:ln w="38100" cap="flat" cmpd="sng" algn="ctr">
+          <a:solidFill>
+            <a:schemeClr val="phClr"/>
+          </a:solidFill>
+          <a:prstDash val="solid"/>
+        </a:ln>
+      </a:lnStyleLst>
+      <a:effectStyleLst>
+        <a:effectStyle>
+          <a:effectLst>
+            <a:outerShdw blurRad="40000" dist="20000" dir="5400000" rotWithShape="0">
+              <a:srgbClr val="000000">
+                <a:alpha val="38000"/>
+              </a:srgbClr>
+            </a:outerShdw>
+          </a:effectLst>
+        </a:effectStyle>
+        <a:effectStyle>
+          <a:effectLst>
+            <a:outerShdw blurRad="40000" dist="23000" dir="5400000" rotWithShape="0">
+              <a:srgbClr val="000000">
+                <a:alpha val="35000"/>
+              </a:srgbClr>
+            </a:outerShdw>
+          </a:effectLst>
+        </a:effectStyle>
+        <a:effectStyle>
+          <a:effectLst>
+            <a:outerShdw blurRad="40000" dist="23000" dir="5400000" rotWithShape="0">
+              <a:srgbClr val="000000">
+                <a:alpha val="35000"/>
+              </a:srgbClr>
+            </a:outerShdw>
+          </a:effectLst>
+          <a:scene3d>
+            <a:camera prst="orthographicFront">
+              <a:rot lat="0" lon="0" rev="0"/>
+            </a:camera>
+            <a:lightRig rig="threePt" dir="t">
+              <a:rot lat="0" lon="0" rev="1200000"/>
+            </a:lightRig>
+          </a:scene3d>
+          <a:sp3d>
+            <a:bevelT w="63500" h="25400"/>
+          </a:sp3d>
+        </a:effectStyle>
+      </a:effectStyleLst>
+      <a:bgFillStyleLst>
+        <a:solidFill>
+          <a:schemeClr val="phClr"/>
+        </a:solidFill>
+        <a:gradFill rotWithShape="1">
+          <a:gsLst>
+            <a:gs pos="0">
+              <a:schemeClr val="phClr">
+                <a:tint val="40000"/>
+                <a:satMod val="350000"/>
+              </a:schemeClr>
+            </a:gs>
+            <a:gs pos="40000">
+              <a:schemeClr val="phClr">
+                <a:tint val="45000"/>
+                <a:shade val="99000"/>
+                <a:satMod val="350000"/>
+              </a:schemeClr>
+            </a:gs>
+            <a:gs pos="100000">
+              <a:schemeClr val="phClr">
+                <a:shade val="20000"/>
+                <a:satMod val="255000"/>
+              </a:schemeClr>
+            </a:gs>
+          </a:gsLst>
+          <a:path path="circle">
+            <a:fillToRect l="50000" t="-80000" r="50000" b="180000"/>
+          </a:path>
+        </a:gradFill>
+        <a:gradFill rotWithShape="1">
+          <a:gsLst>
+            <a:gs pos="0">
+              <a:schemeClr val="phClr">
+                <a:tint val="80000"/>
+                <a:satMod val="300000"/>
+              </a:schemeClr>
+            </a:gs>
+            <a:gs pos="100000">
+              <a:schemeClr val="phClr">
+                <a:shade val="30000"/>
+                <a:satMod val="200000"/>
+              </a:schemeClr>
+            </a:gs>
+          </a:gsLst>
+          <a:path path="circle">
+            <a:fillToRect l="50000" t="50000" r="50000" b="50000"/>
+          </a:path>
+        </a:gradFill>
+      </a:bgFillStyleLst>
+    </a:fmtScheme>
+  </a:themeElements>
+</a:theme>
+</file>
+
+<file path=ppt/theme/theme2.xml><?xml version="1.0" encoding="utf-8"?>
 <a:theme xmlns:a="http://schemas.openxmlformats.org/drawingml/2006/main" xmlns:r="http://schemas.openxmlformats.org/officeDocument/2006/relationships">
   <a:themeElements>
     <a:clrScheme name="Default">
@@ -15112,283 +15655,4 @@
     </a:fmtScheme>
   </a:themeElements>
 </a:theme>
-</file>
-
-<file path=ppt/theme/theme2.xml><?xml version="1.0" encoding="utf-8"?>
-<a:theme xmlns:a="http://schemas.openxmlformats.org/drawingml/2006/main" xmlns:r="http://schemas.openxmlformats.org/officeDocument/2006/relationships" name="Simple Dark">
-  <a:themeElements>
-    <a:clrScheme name="Simple Dark">
-      <a:dk1>
-        <a:srgbClr val="FFFFFF"/>
-      </a:dk1>
-      <a:lt1>
-        <a:srgbClr val="212121"/>
-      </a:lt1>
-      <a:dk2>
-        <a:srgbClr val="303030"/>
-      </a:dk2>
-      <a:lt2>
-        <a:srgbClr val="ADADAD"/>
-      </a:lt2>
-      <a:accent1>
-        <a:srgbClr val="009688"/>
-      </a:accent1>
-      <a:accent2>
-        <a:srgbClr val="EEEEEE"/>
-      </a:accent2>
-      <a:accent3>
-        <a:srgbClr val="78909C"/>
-      </a:accent3>
-      <a:accent4>
-        <a:srgbClr val="FFAB40"/>
-      </a:accent4>
-      <a:accent5>
-        <a:srgbClr val="4DD0E1"/>
-      </a:accent5>
-      <a:accent6>
-        <a:srgbClr val="EEFF41"/>
-      </a:accent6>
-      <a:hlink>
-        <a:srgbClr val="4DD0E1"/>
-      </a:hlink>
-      <a:folHlink>
-        <a:srgbClr val="4DD0E1"/>
-      </a:folHlink>
-    </a:clrScheme>
-    <a:fontScheme name="Office">
-      <a:majorFont>
-        <a:latin typeface="Arial"/>
-        <a:ea typeface=""/>
-        <a:cs typeface=""/>
-        <a:font script="Jpan" typeface="ＭＳ Ｐゴシック"/>
-        <a:font script="Hang" typeface="맑은 고딕"/>
-        <a:font script="Hans" typeface="宋体"/>
-        <a:font script="Hant" typeface="新細明體"/>
-        <a:font script="Arab" typeface="Times New Roman"/>
-        <a:font script="Hebr" typeface="Times New Roman"/>
-        <a:font script="Thai" typeface="Angsana New"/>
-        <a:font script="Ethi" typeface="Nyala"/>
-        <a:font script="Beng" typeface="Vrinda"/>
-        <a:font script="Gujr" typeface="Shruti"/>
-        <a:font script="Khmr" typeface="MoolBoran"/>
-        <a:font script="Knda" typeface="Tunga"/>
-        <a:font script="Guru" typeface="Raavi"/>
-        <a:font script="Cans" typeface="Euphemia"/>
-        <a:font script="Cher" typeface="Plantagenet Cherokee"/>
-        <a:font script="Yiii" typeface="Microsoft Yi Baiti"/>
-        <a:font script="Tibt" typeface="Microsoft Himalaya"/>
-        <a:font script="Thaa" typeface="MV Boli"/>
-        <a:font script="Deva" typeface="Mangal"/>
-        <a:font script="Telu" typeface="Gautami"/>
-        <a:font script="Taml" typeface="Latha"/>
-        <a:font script="Syrc" typeface="Estrangelo Edessa"/>
-        <a:font script="Orya" typeface="Kalinga"/>
-        <a:font script="Mlym" typeface="Kartika"/>
-        <a:font script="Laoo" typeface="DokChampa"/>
-        <a:font script="Sinh" typeface="Iskoola Pota"/>
-        <a:font script="Mong" typeface="Mongolian Baiti"/>
-        <a:font script="Viet" typeface="Times New Roman"/>
-        <a:font script="Uigh" typeface="Microsoft Uighur"/>
-        <a:font script="Geor" typeface="Sylfaen"/>
-      </a:majorFont>
-      <a:minorFont>
-        <a:latin typeface="Arial"/>
-        <a:ea typeface=""/>
-        <a:cs typeface=""/>
-        <a:font script="Jpan" typeface="ＭＳ Ｐゴシック"/>
-        <a:font script="Hang" typeface="맑은 고딕"/>
-        <a:font script="Hans" typeface="宋体"/>
-        <a:font script="Hant" typeface="新細明體"/>
-        <a:font script="Arab" typeface="Arial"/>
-        <a:font script="Hebr" typeface="Arial"/>
-        <a:font script="Thai" typeface="Cordia New"/>
-        <a:font script="Ethi" typeface="Nyala"/>
-        <a:font script="Beng" typeface="Vrinda"/>
-        <a:font script="Gujr" typeface="Shruti"/>
-        <a:font script="Khmr" typeface="DaunPenh"/>
-        <a:font script="Knda" typeface="Tunga"/>
-        <a:font script="Guru" typeface="Raavi"/>
-        <a:font script="Cans" typeface="Euphemia"/>
-        <a:font script="Cher" typeface="Plantagenet Cherokee"/>
-        <a:font script="Yiii" typeface="Microsoft Yi Baiti"/>
-        <a:font script="Tibt" typeface="Microsoft Himalaya"/>
-        <a:font script="Thaa" typeface="MV Boli"/>
-        <a:font script="Deva" typeface="Mangal"/>
-        <a:font script="Telu" typeface="Gautami"/>
-        <a:font script="Taml" typeface="Latha"/>
-        <a:font script="Syrc" typeface="Estrangelo Edessa"/>
-        <a:font script="Orya" typeface="Kalinga"/>
-        <a:font script="Mlym" typeface="Kartika"/>
-        <a:font script="Laoo" typeface="DokChampa"/>
-        <a:font script="Sinh" typeface="Iskoola Pota"/>
-        <a:font script="Mong" typeface="Mongolian Baiti"/>
-        <a:font script="Viet" typeface="Arial"/>
-        <a:font script="Uigh" typeface="Microsoft Uighur"/>
-        <a:font script="Geor" typeface="Sylfaen"/>
-      </a:minorFont>
-    </a:fontScheme>
-    <a:fmtScheme name="Office">
-      <a:fillStyleLst>
-        <a:solidFill>
-          <a:schemeClr val="phClr"/>
-        </a:solidFill>
-        <a:gradFill rotWithShape="1">
-          <a:gsLst>
-            <a:gs pos="0">
-              <a:schemeClr val="phClr">
-                <a:tint val="50000"/>
-                <a:satMod val="300000"/>
-              </a:schemeClr>
-            </a:gs>
-            <a:gs pos="35000">
-              <a:schemeClr val="phClr">
-                <a:tint val="37000"/>
-                <a:satMod val="300000"/>
-              </a:schemeClr>
-            </a:gs>
-            <a:gs pos="100000">
-              <a:schemeClr val="phClr">
-                <a:tint val="15000"/>
-                <a:satMod val="350000"/>
-              </a:schemeClr>
-            </a:gs>
-          </a:gsLst>
-          <a:lin ang="16200000" scaled="1"/>
-        </a:gradFill>
-        <a:gradFill rotWithShape="1">
-          <a:gsLst>
-            <a:gs pos="0">
-              <a:schemeClr val="phClr">
-                <a:tint val="100000"/>
-                <a:shade val="100000"/>
-                <a:satMod val="130000"/>
-              </a:schemeClr>
-            </a:gs>
-            <a:gs pos="100000">
-              <a:schemeClr val="phClr">
-                <a:tint val="50000"/>
-                <a:shade val="100000"/>
-                <a:satMod val="350000"/>
-              </a:schemeClr>
-            </a:gs>
-          </a:gsLst>
-          <a:lin ang="16200000" scaled="0"/>
-        </a:gradFill>
-      </a:fillStyleLst>
-      <a:lnStyleLst>
-        <a:ln w="9525" cap="flat" cmpd="sng" algn="ctr">
-          <a:solidFill>
-            <a:schemeClr val="phClr">
-              <a:shade val="95000"/>
-              <a:satMod val="105000"/>
-            </a:schemeClr>
-          </a:solidFill>
-          <a:prstDash val="solid"/>
-        </a:ln>
-        <a:ln w="25400" cap="flat" cmpd="sng" algn="ctr">
-          <a:solidFill>
-            <a:schemeClr val="phClr"/>
-          </a:solidFill>
-          <a:prstDash val="solid"/>
-        </a:ln>
-        <a:ln w="38100" cap="flat" cmpd="sng" algn="ctr">
-          <a:solidFill>
-            <a:schemeClr val="phClr"/>
-          </a:solidFill>
-          <a:prstDash val="solid"/>
-        </a:ln>
-      </a:lnStyleLst>
-      <a:effectStyleLst>
-        <a:effectStyle>
-          <a:effectLst>
-            <a:outerShdw blurRad="40000" dist="20000" dir="5400000" rotWithShape="0">
-              <a:srgbClr val="000000">
-                <a:alpha val="38000"/>
-              </a:srgbClr>
-            </a:outerShdw>
-          </a:effectLst>
-        </a:effectStyle>
-        <a:effectStyle>
-          <a:effectLst>
-            <a:outerShdw blurRad="40000" dist="23000" dir="5400000" rotWithShape="0">
-              <a:srgbClr val="000000">
-                <a:alpha val="35000"/>
-              </a:srgbClr>
-            </a:outerShdw>
-          </a:effectLst>
-        </a:effectStyle>
-        <a:effectStyle>
-          <a:effectLst>
-            <a:outerShdw blurRad="40000" dist="23000" dir="5400000" rotWithShape="0">
-              <a:srgbClr val="000000">
-                <a:alpha val="35000"/>
-              </a:srgbClr>
-            </a:outerShdw>
-          </a:effectLst>
-          <a:scene3d>
-            <a:camera prst="orthographicFront">
-              <a:rot lat="0" lon="0" rev="0"/>
-            </a:camera>
-            <a:lightRig rig="threePt" dir="t">
-              <a:rot lat="0" lon="0" rev="1200000"/>
-            </a:lightRig>
-          </a:scene3d>
-          <a:sp3d>
-            <a:bevelT w="63500" h="25400"/>
-          </a:sp3d>
-        </a:effectStyle>
-      </a:effectStyleLst>
-      <a:bgFillStyleLst>
-        <a:solidFill>
-          <a:schemeClr val="phClr"/>
-        </a:solidFill>
-        <a:gradFill rotWithShape="1">
-          <a:gsLst>
-            <a:gs pos="0">
-              <a:schemeClr val="phClr">
-                <a:tint val="40000"/>
-                <a:satMod val="350000"/>
-              </a:schemeClr>
-            </a:gs>
-            <a:gs pos="40000">
-              <a:schemeClr val="phClr">
-                <a:tint val="45000"/>
-                <a:shade val="99000"/>
-                <a:satMod val="350000"/>
-              </a:schemeClr>
-            </a:gs>
-            <a:gs pos="100000">
-              <a:schemeClr val="phClr">
-                <a:shade val="20000"/>
-                <a:satMod val="255000"/>
-              </a:schemeClr>
-            </a:gs>
-          </a:gsLst>
-          <a:path path="circle">
-            <a:fillToRect l="50000" t="-80000" r="50000" b="180000"/>
-          </a:path>
-        </a:gradFill>
-        <a:gradFill rotWithShape="1">
-          <a:gsLst>
-            <a:gs pos="0">
-              <a:schemeClr val="phClr">
-                <a:tint val="80000"/>
-                <a:satMod val="300000"/>
-              </a:schemeClr>
-            </a:gs>
-            <a:gs pos="100000">
-              <a:schemeClr val="phClr">
-                <a:shade val="30000"/>
-                <a:satMod val="200000"/>
-              </a:schemeClr>
-            </a:gs>
-          </a:gsLst>
-          <a:path path="circle">
-            <a:fillToRect l="50000" t="50000" r="50000" b="50000"/>
-          </a:path>
-        </a:gradFill>
-      </a:bgFillStyleLst>
-    </a:fmtScheme>
-  </a:themeElements>
-</a:theme>
 </file>
</xml_diff>